<commit_message>
Update Marketplace for Image Processing  Application using Task Management.pptx
</commit_message>
<xml_diff>
--- a/Docs/Final-document/Marketplace for Image Processing  Application using Task Management.pptx
+++ b/Docs/Final-document/Marketplace for Image Processing  Application using Task Management.pptx
@@ -3244,31 +3244,7 @@
           </a:bodyPr>
           <a:lstStyle/>
           <a:p>
-            <a:r>
-              <a:rPr lang="th-TH" sz="15000" dirty="0">
-                <a:solidFill>
-                  <a:srgbClr val="FF0000"/>
-                </a:solidFill>
-                <a:highlight>
-                  <a:srgbClr val="FFFF00"/>
-                </a:highlight>
-              </a:rPr>
-              <a:t>กาเบอร์ 7</a:t>
-            </a:r>
-          </a:p>
-          <a:p>
-            <a:r>
-              <a:rPr lang="th-TH" sz="15000" dirty="0">
-                <a:solidFill>
-                  <a:srgbClr val="FF0000"/>
-                </a:solidFill>
-                <a:highlight>
-                  <a:srgbClr val="FFFF00"/>
-                </a:highlight>
-              </a:rPr>
-              <a:t>เจ็ดยับจับเย็ด</a:t>
-            </a:r>
-            <a:endParaRPr lang="en-GB" sz="15000" dirty="0">
+            <a:endParaRPr lang="th-TH" sz="15000" dirty="0">
               <a:solidFill>
                 <a:srgbClr val="FF0000"/>
               </a:solidFill>

</xml_diff>